<commit_message>
Added acroymns in seperate box, LBSTRESC populated, typos & format changes
</commit_message>
<xml_diff>
--- a/inst/CDISC_Europe_Interchange_2024/CDISC_EI_2024-Poster.pptx
+++ b/inst/CDISC_Europe_Interchange_2024/CDISC_EI_2024-Poster.pptx
@@ -226,7 +226,7 @@
           <a:p>
             <a:fld id="{DF2B9998-7FC2-40BB-812D-D42712794F0A}" type="datetimeFigureOut">
               <a:rPr lang="en-US" smtClean="0"/>
-              <a:t>4/4/2024</a:t>
+              <a:t>4/5/2024</a:t>
             </a:fld>
             <a:endParaRPr lang="en-US"/>
           </a:p>
@@ -403,7 +403,7 @@
           <a:p>
             <a:fld id="{19EE1A3E-C737-584E-86B0-F484DE311626}" type="datetimeFigureOut">
               <a:rPr lang="en-US" smtClean="0"/>
-              <a:t>4/4/2024</a:t>
+              <a:t>4/5/2024</a:t>
             </a:fld>
             <a:endParaRPr lang="en-US"/>
           </a:p>
@@ -2951,6 +2951,140 @@
           </p:cxnSp>
         </p:grpSp>
       </p:grpSp>
+      <p:sp>
+        <p:nvSpPr>
+          <p:cNvPr id="53" name="Rectangle 52">
+            <a:extLst>
+              <a:ext uri="{FF2B5EF4-FFF2-40B4-BE49-F238E27FC236}">
+                <a16:creationId xmlns:a16="http://schemas.microsoft.com/office/drawing/2014/main" id="{741B1309-28BF-488B-87E6-32FA449C0715}"/>
+              </a:ext>
+            </a:extLst>
+          </p:cNvPr>
+          <p:cNvSpPr/>
+          <p:nvPr/>
+        </p:nvSpPr>
+        <p:spPr>
+          <a:xfrm>
+            <a:off x="11730539" y="14134736"/>
+            <a:ext cx="9359900" cy="574675"/>
+          </a:xfrm>
+          <a:prstGeom prst="rect">
+            <a:avLst/>
+          </a:prstGeom>
+          <a:solidFill>
+            <a:schemeClr val="accent3">
+              <a:lumMod val="20000"/>
+              <a:lumOff val="80000"/>
+            </a:schemeClr>
+          </a:solidFill>
+          <a:ln>
+            <a:solidFill>
+              <a:schemeClr val="accent3">
+                <a:lumMod val="20000"/>
+                <a:lumOff val="80000"/>
+              </a:schemeClr>
+            </a:solidFill>
+          </a:ln>
+          <a:effectLst>
+            <a:outerShdw blurRad="50800" dist="38100" dir="2700000" algn="tl" rotWithShape="0">
+              <a:prstClr val="black">
+                <a:alpha val="40000"/>
+              </a:prstClr>
+            </a:outerShdw>
+          </a:effectLst>
+        </p:spPr>
+        <p:style>
+          <a:lnRef idx="2">
+            <a:schemeClr val="accent1">
+              <a:shade val="50000"/>
+            </a:schemeClr>
+          </a:lnRef>
+          <a:fillRef idx="1">
+            <a:schemeClr val="accent1"/>
+          </a:fillRef>
+          <a:effectRef idx="0">
+            <a:schemeClr val="accent1"/>
+          </a:effectRef>
+          <a:fontRef idx="minor">
+            <a:schemeClr val="lt1"/>
+          </a:fontRef>
+        </p:style>
+        <p:txBody>
+          <a:bodyPr rtlCol="0" anchor="ctr"/>
+          <a:lstStyle/>
+          <a:p>
+            <a:pPr algn="ctr"/>
+            <a:endParaRPr lang="en-GB"/>
+          </a:p>
+        </p:txBody>
+      </p:sp>
+      <p:sp>
+        <p:nvSpPr>
+          <p:cNvPr id="4" name="Rectangle 3">
+            <a:extLst>
+              <a:ext uri="{FF2B5EF4-FFF2-40B4-BE49-F238E27FC236}">
+                <a16:creationId xmlns:a16="http://schemas.microsoft.com/office/drawing/2014/main" id="{6B0A275F-D3C3-4F4C-A55A-1AEF29F91B74}"/>
+              </a:ext>
+            </a:extLst>
+          </p:cNvPr>
+          <p:cNvSpPr/>
+          <p:nvPr/>
+        </p:nvSpPr>
+        <p:spPr>
+          <a:xfrm>
+            <a:off x="616382" y="12713110"/>
+            <a:ext cx="9456925" cy="1855240"/>
+          </a:xfrm>
+          <a:prstGeom prst="rect">
+            <a:avLst/>
+          </a:prstGeom>
+          <a:solidFill>
+            <a:schemeClr val="accent3">
+              <a:lumMod val="20000"/>
+              <a:lumOff val="80000"/>
+            </a:schemeClr>
+          </a:solidFill>
+          <a:ln>
+            <a:solidFill>
+              <a:schemeClr val="accent3">
+                <a:lumMod val="20000"/>
+                <a:lumOff val="80000"/>
+              </a:schemeClr>
+            </a:solidFill>
+          </a:ln>
+          <a:effectLst>
+            <a:outerShdw blurRad="50800" dist="38100" dir="2700000" algn="tl" rotWithShape="0">
+              <a:prstClr val="black">
+                <a:alpha val="40000"/>
+              </a:prstClr>
+            </a:outerShdw>
+          </a:effectLst>
+        </p:spPr>
+        <p:style>
+          <a:lnRef idx="2">
+            <a:schemeClr val="accent1">
+              <a:shade val="50000"/>
+            </a:schemeClr>
+          </a:lnRef>
+          <a:fillRef idx="1">
+            <a:schemeClr val="accent1"/>
+          </a:fillRef>
+          <a:effectRef idx="0">
+            <a:schemeClr val="accent1"/>
+          </a:effectRef>
+          <a:fontRef idx="minor">
+            <a:schemeClr val="lt1"/>
+          </a:fontRef>
+        </p:style>
+        <p:txBody>
+          <a:bodyPr rtlCol="0" anchor="ctr"/>
+          <a:lstStyle/>
+          <a:p>
+            <a:pPr algn="ctr"/>
+            <a:endParaRPr lang="en-GB"/>
+          </a:p>
+        </p:txBody>
+      </p:sp>
       <p:pic>
         <p:nvPicPr>
           <p:cNvPr id="2" name="Picture 1">
@@ -3056,7 +3190,7 @@
         </p:nvSpPr>
         <p:spPr>
           <a:xfrm>
-            <a:off x="2058193" y="43276322"/>
+            <a:off x="2058193" y="43187831"/>
             <a:ext cx="28802013" cy="755650"/>
           </a:xfrm>
           <a:prstGeom prst="rect">
@@ -3637,7 +3771,7 @@
                   <a:ea typeface="+mn-ea"/>
                   <a:cs typeface="Arial" panose="020B0604020202020204" pitchFamily="34" charset="0"/>
                 </a:rPr>
-                <a:t>Generation of standardised analysis dataset, using custom SDTM implementation is possible, demonstrating ability to speed up exploratory data analysis and </a:t>
+                <a:t>Generation of standardised analysis datasets, using custom SDTM implementation, is possible, demonstrating ability to speed up exploratory data analysis and </a:t>
               </a:r>
               <a:r>
                 <a:rPr kumimoji="0" lang="en-GB" sz="3400" b="1" i="0" u="none" strike="noStrike" kern="1200" cap="none" spc="0" normalizeH="0" baseline="0" noProof="0" dirty="0">
@@ -3654,7 +3788,7 @@
                   <a:ea typeface="+mn-ea"/>
                   <a:cs typeface="Arial" panose="020B0604020202020204" pitchFamily="34" charset="0"/>
                 </a:rPr>
-                <a:t>makes the SDTM format more accessible </a:t>
+                <a:t>making the SDTM format more accessible </a:t>
               </a:r>
               <a:r>
                 <a:rPr kumimoji="0" lang="en-GB" sz="3400" b="0" i="0" u="none" strike="noStrike" kern="1200" cap="none" spc="0" normalizeH="0" baseline="0" noProof="0" dirty="0">
@@ -4649,10 +4783,10 @@
         </p:nvGrpSpPr>
         <p:grpSpPr>
           <a:xfrm>
-            <a:off x="649464" y="6038761"/>
-            <a:ext cx="9423843" cy="7717035"/>
+            <a:off x="649464" y="5832282"/>
+            <a:ext cx="9423843" cy="10631679"/>
             <a:chOff x="699991" y="8353657"/>
-            <a:chExt cx="9456924" cy="7717035"/>
+            <a:chExt cx="9456924" cy="10631679"/>
           </a:xfrm>
         </p:grpSpPr>
         <p:sp>
@@ -4672,7 +4806,7 @@
           <p:spPr>
             <a:xfrm>
               <a:off x="699991" y="9200198"/>
-              <a:ext cx="9456924" cy="6870494"/>
+              <a:ext cx="9456924" cy="9785138"/>
             </a:xfrm>
             <a:prstGeom prst="rect">
               <a:avLst/>
@@ -4896,7 +5030,7 @@
                   <a:ea typeface="+mn-ea"/>
                   <a:cs typeface="Arial" panose="020B0604020202020204" pitchFamily="34" charset="0"/>
                 </a:rPr>
-                <a:t>Study Data Tabulation Model (SDTM) </a:t>
+                <a:t>SDTM </a:t>
               </a:r>
               <a:r>
                 <a:rPr kumimoji="0" lang="en-GB" sz="3400" b="0" i="0" u="none" strike="noStrike" kern="1200" cap="none" spc="0" normalizeH="0" baseline="0" noProof="0" dirty="0">
@@ -4951,7 +5085,7 @@
                   <a:ea typeface="+mn-ea"/>
                   <a:cs typeface="Arial" panose="020B0604020202020204" pitchFamily="34" charset="0"/>
                 </a:rPr>
-                <a:t>Using SDTM for heterogeneous historical studies requires customisation in the standard implementation at the </a:t>
+                <a:t>Using SDTM for heterogeneous historical studies requires customisation in the standard implementation at </a:t>
               </a:r>
               <a:r>
                 <a:rPr kumimoji="0" lang="en-GB" sz="3400" b="1" i="0" u="none" strike="noStrike" kern="1200" cap="none" spc="0" normalizeH="0" baseline="0" noProof="0" dirty="0">
@@ -4968,7 +5102,7 @@
                   <a:ea typeface="+mn-ea"/>
                   <a:cs typeface="Arial" panose="020B0604020202020204" pitchFamily="34" charset="0"/>
                 </a:rPr>
-                <a:t>Infectious Disease Data Observatory (IDDO).</a:t>
+                <a:t>IDDO.</a:t>
               </a:r>
             </a:p>
             <a:p>
@@ -5043,6 +5177,23 @@
                 <a:t> for researchers in </a:t>
               </a:r>
               <a:r>
+                <a:rPr kumimoji="0" lang="en-GB" sz="3400" b="1" i="0" u="none" strike="noStrike" kern="1200" cap="none" spc="0" normalizeH="0" baseline="0" noProof="0" dirty="0">
+                  <a:ln>
+                    <a:noFill/>
+                  </a:ln>
+                  <a:solidFill>
+                    <a:srgbClr val="435C6D"/>
+                  </a:solidFill>
+                  <a:effectLst/>
+                  <a:uLnTx/>
+                  <a:uFillTx/>
+                  <a:latin typeface="Arial" panose="020B0604020202020204" pitchFamily="34" charset="0"/>
+                  <a:ea typeface="+mn-ea"/>
+                  <a:cs typeface="Arial" panose="020B0604020202020204" pitchFamily="34" charset="0"/>
+                </a:rPr>
+                <a:t>LMICs</a:t>
+              </a:r>
+              <a:r>
                 <a:rPr kumimoji="0" lang="en-GB" sz="3400" i="0" u="none" strike="noStrike" kern="1200" cap="none" spc="0" normalizeH="0" baseline="0" noProof="0" dirty="0">
                   <a:ln>
                     <a:noFill/>
@@ -5057,24 +5208,7 @@
                   <a:ea typeface="+mn-ea"/>
                   <a:cs typeface="Arial" panose="020B0604020202020204" pitchFamily="34" charset="0"/>
                 </a:rPr>
-                <a:t>Low- and Middle-Income Countries </a:t>
-              </a:r>
-              <a:r>
-                <a:rPr kumimoji="0" lang="en-GB" sz="3400" b="1" i="0" u="none" strike="noStrike" kern="1200" cap="none" spc="0" normalizeH="0" baseline="0" noProof="0" dirty="0">
-                  <a:ln>
-                    <a:noFill/>
-                  </a:ln>
-                  <a:solidFill>
-                    <a:srgbClr val="435C6D"/>
-                  </a:solidFill>
-                  <a:effectLst/>
-                  <a:uLnTx/>
-                  <a:uFillTx/>
-                  <a:latin typeface="Arial" panose="020B0604020202020204" pitchFamily="34" charset="0"/>
-                  <a:ea typeface="+mn-ea"/>
-                  <a:cs typeface="Arial" panose="020B0604020202020204" pitchFamily="34" charset="0"/>
-                </a:rPr>
-                <a:t>(LMICs) </a:t>
+                <a:t> </a:t>
               </a:r>
               <a:r>
                 <a:rPr kumimoji="0" lang="en-GB" sz="3400" b="0" i="0" u="none" strike="noStrike" kern="1200" cap="none" spc="0" normalizeH="0" baseline="0" noProof="0" dirty="0">
@@ -5093,6 +5227,135 @@
                 </a:rPr>
                 <a:t>due to education, time and resource limitations.</a:t>
               </a:r>
+            </a:p>
+            <a:p>
+              <a:pPr marL="0" lvl="0" indent="0">
+                <a:lnSpc>
+                  <a:spcPct val="50000"/>
+                </a:lnSpc>
+                <a:buClr>
+                  <a:srgbClr val="E31B23"/>
+                </a:buClr>
+                <a:buNone/>
+                <a:defRPr/>
+              </a:pPr>
+              <a:endParaRPr lang="en-GB" sz="800" b="1" dirty="0">
+                <a:solidFill>
+                  <a:srgbClr val="435C6D"/>
+                </a:solidFill>
+              </a:endParaRPr>
+            </a:p>
+            <a:p>
+              <a:pPr marL="0" lvl="0" indent="0">
+                <a:lnSpc>
+                  <a:spcPct val="50000"/>
+                </a:lnSpc>
+                <a:buClr>
+                  <a:srgbClr val="E31B23"/>
+                </a:buClr>
+                <a:buNone/>
+                <a:defRPr/>
+              </a:pPr>
+              <a:r>
+                <a:rPr lang="en-GB" sz="3400" b="1" dirty="0">
+                  <a:solidFill>
+                    <a:srgbClr val="435C6D"/>
+                  </a:solidFill>
+                </a:rPr>
+                <a:t>SDTM - </a:t>
+              </a:r>
+              <a:r>
+                <a:rPr lang="en-GB" sz="3400" dirty="0">
+                  <a:solidFill>
+                    <a:srgbClr val="435C6D"/>
+                  </a:solidFill>
+                </a:rPr>
+                <a:t>Study Data Tabulation Model </a:t>
+              </a:r>
+            </a:p>
+            <a:p>
+              <a:pPr marL="0" lvl="0" indent="0">
+                <a:lnSpc>
+                  <a:spcPct val="50000"/>
+                </a:lnSpc>
+                <a:buClr>
+                  <a:srgbClr val="E31B23"/>
+                </a:buClr>
+                <a:buNone/>
+                <a:defRPr/>
+              </a:pPr>
+              <a:r>
+                <a:rPr lang="en-GB" sz="3400" b="1" dirty="0">
+                  <a:solidFill>
+                    <a:srgbClr val="435C6D"/>
+                  </a:solidFill>
+                </a:rPr>
+                <a:t>IDDO - </a:t>
+              </a:r>
+              <a:r>
+                <a:rPr lang="en-GB" sz="3400" dirty="0">
+                  <a:solidFill>
+                    <a:srgbClr val="435C6D"/>
+                  </a:solidFill>
+                </a:rPr>
+                <a:t>Infectious Disease Data Observatory </a:t>
+              </a:r>
+            </a:p>
+            <a:p>
+              <a:pPr marL="0" lvl="0" indent="0">
+                <a:lnSpc>
+                  <a:spcPct val="50000"/>
+                </a:lnSpc>
+                <a:buClr>
+                  <a:srgbClr val="E31B23"/>
+                </a:buClr>
+                <a:buNone/>
+                <a:defRPr/>
+              </a:pPr>
+              <a:r>
+                <a:rPr lang="en-GB" sz="3400" b="1" dirty="0">
+                  <a:solidFill>
+                    <a:srgbClr val="435C6D"/>
+                  </a:solidFill>
+                </a:rPr>
+                <a:t>LMICs - </a:t>
+              </a:r>
+              <a:r>
+                <a:rPr lang="en-GB" sz="3400" dirty="0">
+                  <a:solidFill>
+                    <a:srgbClr val="435C6D"/>
+                  </a:solidFill>
+                </a:rPr>
+                <a:t>Low- and Middle-Income Countries</a:t>
+              </a:r>
+            </a:p>
+            <a:p>
+              <a:pPr marL="0" lvl="0" indent="0">
+                <a:buClr>
+                  <a:srgbClr val="E31B23"/>
+                </a:buClr>
+                <a:buNone/>
+                <a:defRPr/>
+              </a:pPr>
+              <a:endParaRPr lang="en-GB" sz="3400" b="1" dirty="0">
+                <a:solidFill>
+                  <a:srgbClr val="435C6D"/>
+                </a:solidFill>
+              </a:endParaRPr>
+            </a:p>
+            <a:p>
+              <a:pPr marL="0" lvl="0" indent="0">
+                <a:buClr>
+                  <a:srgbClr val="E31B23"/>
+                </a:buClr>
+                <a:buNone/>
+                <a:defRPr/>
+              </a:pPr>
+              <a:endParaRPr lang="en-GB" sz="3400" dirty="0">
+                <a:solidFill>
+                  <a:srgbClr val="435C6D"/>
+                </a:solidFill>
+              </a:endParaRPr>
             </a:p>
           </p:txBody>
         </p:sp>
@@ -5405,10 +5668,10 @@
         </p:nvGrpSpPr>
         <p:grpSpPr>
           <a:xfrm>
-            <a:off x="21850350" y="6003558"/>
-            <a:ext cx="10451668" cy="8563420"/>
+            <a:off x="21850350" y="5797079"/>
+            <a:ext cx="10451668" cy="8515715"/>
             <a:chOff x="699991" y="8353657"/>
-            <a:chExt cx="9456924" cy="8563420"/>
+            <a:chExt cx="9456924" cy="8515715"/>
           </a:xfrm>
         </p:grpSpPr>
         <p:sp>
@@ -5428,7 +5691,7 @@
           <p:spPr>
             <a:xfrm>
               <a:off x="699991" y="9200198"/>
-              <a:ext cx="9456924" cy="7716879"/>
+              <a:ext cx="9456924" cy="7669174"/>
             </a:xfrm>
             <a:prstGeom prst="rect">
               <a:avLst/>
@@ -5652,39 +5915,7 @@
                     <a:srgbClr val="435C6D"/>
                   </a:solidFill>
                 </a:rPr>
-                <a:t>convert blanks to NA </a:t>
-              </a:r>
-              <a:r>
-                <a:rPr lang="en-GB" sz="3400" dirty="0">
-                  <a:solidFill>
-                    <a:srgbClr val="435C6D"/>
-                  </a:solidFill>
-                </a:rPr>
-                <a:t>and </a:t>
-              </a:r>
-              <a:r>
-                <a:rPr lang="en-GB" sz="3400" b="1" dirty="0">
-                  <a:solidFill>
-                    <a:srgbClr val="435C6D"/>
-                  </a:solidFill>
-                </a:rPr>
-                <a:t>results to upper case </a:t>
-              </a:r>
-              <a:r>
-                <a:rPr lang="en-GB" sz="3400" dirty="0">
-                  <a:solidFill>
-                    <a:srgbClr val="435C6D"/>
-                  </a:solidFill>
-                </a:rPr>
-                <a:t>and </a:t>
-              </a:r>
-              <a:r>
-                <a:rPr lang="en-GB" sz="3400" b="1" dirty="0">
-                  <a:solidFill>
-                    <a:srgbClr val="435C6D"/>
-                  </a:solidFill>
-                </a:rPr>
-                <a:t>character</a:t>
+                <a:t>convert blanks to NA and results to upper case, character</a:t>
               </a:r>
               <a:r>
                 <a:rPr lang="en-GB" sz="3400" dirty="0">
@@ -5693,6 +5924,29 @@
                   </a:solidFill>
                 </a:rPr>
                 <a:t> class.</a:t>
+              </a:r>
+            </a:p>
+            <a:p>
+              <a:pPr>
+                <a:buClr>
+                  <a:srgbClr val="E31B23"/>
+                </a:buClr>
+              </a:pPr>
+              <a:r>
+                <a:rPr lang="en-GB" sz="3400" b="1" dirty="0">
+                  <a:solidFill>
+                    <a:srgbClr val="435C6D"/>
+                  </a:solidFill>
+                </a:rPr>
+                <a:t>Filter</a:t>
+              </a:r>
+              <a:r>
+                <a:rPr lang="en-GB" sz="3400" dirty="0">
+                  <a:solidFill>
+                    <a:srgbClr val="435C6D"/>
+                  </a:solidFill>
+                </a:rPr>
+                <a:t> variables of interest.</a:t>
               </a:r>
             </a:p>
             <a:p>
@@ -5751,29 +6005,6 @@
                 </a:buClr>
               </a:pPr>
               <a:r>
-                <a:rPr lang="en-GB" sz="3400" b="1" dirty="0">
-                  <a:solidFill>
-                    <a:srgbClr val="435C6D"/>
-                  </a:solidFill>
-                </a:rPr>
-                <a:t>Filter</a:t>
-              </a:r>
-              <a:r>
-                <a:rPr lang="en-GB" sz="3400" dirty="0">
-                  <a:solidFill>
-                    <a:srgbClr val="435C6D"/>
-                  </a:solidFill>
-                </a:rPr>
-                <a:t> variables, which users can specify and add to using the VARS parameter, among other domain and timing specific filters.</a:t>
-              </a:r>
-            </a:p>
-            <a:p>
-              <a:pPr>
-                <a:buClr>
-                  <a:srgbClr val="E31B23"/>
-                </a:buClr>
-              </a:pPr>
-              <a:r>
                 <a:rPr kumimoji="0" lang="en-GB" sz="3400" b="1" i="0" u="none" strike="noStrike" kern="1200" cap="none" spc="0" normalizeH="0" baseline="0" noProof="0" dirty="0">
                   <a:ln>
                     <a:noFill/>
@@ -5788,7 +6019,24 @@
                   <a:ea typeface="+mn-ea"/>
                   <a:cs typeface="Arial" panose="020B0604020202020204" pitchFamily="34" charset="0"/>
                 </a:rPr>
-                <a:t>Pivot the domain wider </a:t>
+                <a:t>Pivot the domain wider</a:t>
+              </a:r>
+              <a:r>
+                <a:rPr kumimoji="0" lang="en-GB" sz="3400" i="0" u="none" strike="noStrike" kern="1200" cap="none" spc="0" normalizeH="0" baseline="0" noProof="0" dirty="0">
+                  <a:ln>
+                    <a:noFill/>
+                  </a:ln>
+                  <a:solidFill>
+                    <a:srgbClr val="435C6D"/>
+                  </a:solidFill>
+                  <a:effectLst/>
+                  <a:uLnTx/>
+                  <a:uFillTx/>
+                  <a:latin typeface="Arial" panose="020B0604020202020204" pitchFamily="34" charset="0"/>
+                  <a:ea typeface="+mn-ea"/>
+                  <a:cs typeface="Arial" panose="020B0604020202020204" pitchFamily="34" charset="0"/>
+                </a:rPr>
+                <a:t>, </a:t>
               </a:r>
               <a:r>
                 <a:rPr kumimoji="0" lang="en-GB" sz="3400" b="0" i="0" u="none" strike="noStrike" kern="1200" cap="none" spc="0" normalizeH="0" baseline="0" noProof="0" dirty="0">
@@ -5807,6 +6055,43 @@
                 </a:rPr>
                 <a:t>so the terms or tests are now columns.</a:t>
               </a:r>
+            </a:p>
+            <a:p>
+              <a:pPr>
+                <a:buClr>
+                  <a:srgbClr val="E31B23"/>
+                </a:buClr>
+              </a:pPr>
+              <a:r>
+                <a:rPr lang="en-GB" sz="3400" b="1" dirty="0">
+                  <a:solidFill>
+                    <a:srgbClr val="435C6D"/>
+                  </a:solidFill>
+                </a:rPr>
+                <a:t>Clean</a:t>
+              </a:r>
+              <a:r>
+                <a:rPr lang="en-GB" sz="3400" dirty="0">
+                  <a:solidFill>
+                    <a:srgbClr val="435C6D"/>
+                  </a:solidFill>
+                </a:rPr>
+                <a:t> column names.</a:t>
+              </a:r>
+              <a:endParaRPr kumimoji="0" lang="en-GB" sz="3400" b="0" i="0" u="none" strike="noStrike" kern="1200" cap="none" spc="0" normalizeH="0" baseline="0" noProof="0" dirty="0">
+                <a:ln>
+                  <a:noFill/>
+                </a:ln>
+                <a:solidFill>
+                  <a:srgbClr val="435C6D"/>
+                </a:solidFill>
+                <a:effectLst/>
+                <a:uLnTx/>
+                <a:uFillTx/>
+                <a:latin typeface="Arial" panose="020B0604020202020204" pitchFamily="34" charset="0"/>
+                <a:ea typeface="+mn-ea"/>
+                <a:cs typeface="Arial" panose="020B0604020202020204" pitchFamily="34" charset="0"/>
+              </a:endParaRPr>
             </a:p>
           </p:txBody>
         </p:sp>
@@ -6119,10 +6404,10 @@
         </p:nvGrpSpPr>
         <p:grpSpPr>
           <a:xfrm>
-            <a:off x="11730538" y="6038761"/>
-            <a:ext cx="9456924" cy="9505217"/>
+            <a:off x="11730538" y="5832282"/>
+            <a:ext cx="9456924" cy="9034318"/>
             <a:chOff x="699991" y="8353657"/>
-            <a:chExt cx="9456924" cy="9505217"/>
+            <a:chExt cx="9456924" cy="9034318"/>
           </a:xfrm>
         </p:grpSpPr>
         <p:sp>
@@ -6142,7 +6427,7 @@
           <p:spPr>
             <a:xfrm>
               <a:off x="699991" y="9200198"/>
-              <a:ext cx="9456924" cy="8658676"/>
+              <a:ext cx="9456924" cy="8187777"/>
             </a:xfrm>
             <a:prstGeom prst="rect">
               <a:avLst/>
@@ -6463,7 +6748,7 @@
                     <a:srgbClr val="435C6D"/>
                   </a:solidFill>
                 </a:rPr>
-                <a:t>This reduces the amount of duplicated work and </a:t>
+                <a:t>Reduce the amount of duplicated work and </a:t>
               </a:r>
               <a:r>
                 <a:rPr lang="en-GB" sz="3400" b="1" dirty="0">
@@ -6471,7 +6756,7 @@
                     <a:srgbClr val="435C6D"/>
                   </a:solidFill>
                 </a:rPr>
-                <a:t>prompts reproducible outputs</a:t>
+                <a:t>prompt reproducible outputs</a:t>
               </a:r>
               <a:r>
                 <a:rPr lang="en-GB" sz="3400" dirty="0">
@@ -6586,11 +6871,79 @@
                   <a:ea typeface="+mn-ea"/>
                   <a:cs typeface="Arial" panose="020B0604020202020204" pitchFamily="34" charset="0"/>
                 </a:rPr>
-                <a:t>to improve data use, such as recalculating Body Mass Index results and including Child Growth Standards into outputs.</a:t>
+                <a:t>to improve data use, such as recalculating </a:t>
+              </a:r>
+              <a:r>
+                <a:rPr kumimoji="0" lang="en-GB" sz="3400" b="1" i="0" u="none" strike="noStrike" kern="1200" cap="none" spc="0" normalizeH="0" baseline="0" noProof="0" dirty="0">
+                  <a:ln>
+                    <a:noFill/>
+                  </a:ln>
+                  <a:solidFill>
+                    <a:srgbClr val="435C6D"/>
+                  </a:solidFill>
+                  <a:effectLst/>
+                  <a:uLnTx/>
+                  <a:uFillTx/>
+                  <a:latin typeface="Arial" panose="020B0604020202020204" pitchFamily="34" charset="0"/>
+                  <a:ea typeface="+mn-ea"/>
+                  <a:cs typeface="Arial" panose="020B0604020202020204" pitchFamily="34" charset="0"/>
+                </a:rPr>
+                <a:t>BMI</a:t>
+              </a:r>
+              <a:r>
+                <a:rPr kumimoji="0" lang="en-GB" sz="3400" b="0" i="0" u="none" strike="noStrike" kern="1200" cap="none" spc="0" normalizeH="0" baseline="0" noProof="0" dirty="0">
+                  <a:ln>
+                    <a:noFill/>
+                  </a:ln>
+                  <a:solidFill>
+                    <a:srgbClr val="435C6D"/>
+                  </a:solidFill>
+                  <a:effectLst/>
+                  <a:uLnTx/>
+                  <a:uFillTx/>
+                  <a:latin typeface="Arial" panose="020B0604020202020204" pitchFamily="34" charset="0"/>
+                  <a:ea typeface="+mn-ea"/>
+                  <a:cs typeface="Arial" panose="020B0604020202020204" pitchFamily="34" charset="0"/>
+                </a:rPr>
+                <a:t> results and including Child </a:t>
+              </a:r>
+              <a:r>
+                <a:rPr kumimoji="0" lang="en-GB" sz="3400" b="1" i="0" u="none" strike="noStrike" kern="1200" cap="none" spc="0" normalizeH="0" baseline="0" noProof="0" dirty="0">
+                  <a:ln>
+                    <a:noFill/>
+                  </a:ln>
+                  <a:solidFill>
+                    <a:srgbClr val="435C6D"/>
+                  </a:solidFill>
+                  <a:effectLst/>
+                  <a:uLnTx/>
+                  <a:uFillTx/>
+                  <a:latin typeface="Arial" panose="020B0604020202020204" pitchFamily="34" charset="0"/>
+                  <a:ea typeface="+mn-ea"/>
+                  <a:cs typeface="Arial" panose="020B0604020202020204" pitchFamily="34" charset="0"/>
+                </a:rPr>
+                <a:t>Growth Standards</a:t>
+              </a:r>
+              <a:r>
+                <a:rPr kumimoji="0" lang="en-GB" sz="3400" i="0" u="none" strike="noStrike" kern="1200" cap="none" spc="0" normalizeH="0" baseline="0" noProof="0" dirty="0">
+                  <a:ln>
+                    <a:noFill/>
+                  </a:ln>
+                  <a:solidFill>
+                    <a:srgbClr val="435C6D"/>
+                  </a:solidFill>
+                  <a:effectLst/>
+                  <a:uLnTx/>
+                  <a:uFillTx/>
+                  <a:latin typeface="Arial" panose="020B0604020202020204" pitchFamily="34" charset="0"/>
+                  <a:ea typeface="+mn-ea"/>
+                  <a:cs typeface="Arial" panose="020B0604020202020204" pitchFamily="34" charset="0"/>
+                </a:rPr>
+                <a:t>.</a:t>
               </a:r>
             </a:p>
             <a:p>
-              <a:pPr marL="266700" marR="0" lvl="0" indent="-266700" algn="l" defTabSz="3027487" rtl="0" eaLnBrk="1" fontAlgn="auto" latinLnBrk="0" hangingPunct="1">
+              <a:pPr marL="0" marR="0" lvl="0" indent="0" algn="l" defTabSz="3027487" rtl="0" eaLnBrk="1" fontAlgn="auto" latinLnBrk="0" hangingPunct="1">
                 <a:lnSpc>
                   <a:spcPct val="90000"/>
                 </a:lnSpc>
@@ -6604,25 +6957,44 @@
                   <a:srgbClr val="E31B23"/>
                 </a:buClr>
                 <a:buSzTx/>
-                <a:buFont typeface="Wingdings" panose="05000000000000000000" pitchFamily="2" charset="2"/>
-                <a:buChar char="§"/>
+                <a:buNone/>
                 <a:tabLst/>
                 <a:defRPr/>
               </a:pPr>
-              <a:endParaRPr kumimoji="0" lang="en-GB" sz="3400" b="0" i="0" u="none" strike="noStrike" kern="1200" cap="none" spc="0" normalizeH="0" baseline="0" noProof="0" dirty="0">
-                <a:ln>
-                  <a:noFill/>
-                </a:ln>
-                <a:solidFill>
-                  <a:srgbClr val="435C6D"/>
-                </a:solidFill>
-                <a:effectLst/>
-                <a:uLnTx/>
-                <a:uFillTx/>
-                <a:latin typeface="Arial" panose="020B0604020202020204" pitchFamily="34" charset="0"/>
-                <a:ea typeface="+mn-ea"/>
-                <a:cs typeface="Arial" panose="020B0604020202020204" pitchFamily="34" charset="0"/>
-              </a:endParaRPr>
+              <a:r>
+                <a:rPr kumimoji="0" lang="en-GB" sz="3400" b="1" i="0" u="none" strike="noStrike" kern="1200" cap="none" spc="0" normalizeH="0" baseline="0" noProof="0" dirty="0">
+                  <a:ln>
+                    <a:noFill/>
+                  </a:ln>
+                  <a:solidFill>
+                    <a:srgbClr val="435C6D"/>
+                  </a:solidFill>
+                  <a:effectLst/>
+                  <a:uLnTx/>
+                  <a:uFillTx/>
+                  <a:latin typeface="Arial" panose="020B0604020202020204" pitchFamily="34" charset="0"/>
+                  <a:ea typeface="+mn-ea"/>
+                  <a:cs typeface="Arial" panose="020B0604020202020204" pitchFamily="34" charset="0"/>
+                </a:rPr>
+                <a:t>BMI</a:t>
+              </a:r>
+              <a:r>
+                <a:rPr kumimoji="0" lang="en-GB" sz="3400" b="0" i="0" u="none" strike="noStrike" kern="1200" cap="none" spc="0" normalizeH="0" baseline="0" noProof="0" dirty="0">
+                  <a:ln>
+                    <a:noFill/>
+                  </a:ln>
+                  <a:solidFill>
+                    <a:srgbClr val="435C6D"/>
+                  </a:solidFill>
+                  <a:effectLst/>
+                  <a:uLnTx/>
+                  <a:uFillTx/>
+                  <a:latin typeface="Arial" panose="020B0604020202020204" pitchFamily="34" charset="0"/>
+                  <a:ea typeface="+mn-ea"/>
+                  <a:cs typeface="Arial" panose="020B0604020202020204" pitchFamily="34" charset="0"/>
+                </a:rPr>
+                <a:t> – Body Mass Index</a:t>
+              </a:r>
             </a:p>
           </p:txBody>
         </p:sp>
@@ -7455,7 +7827,7 @@
           <p:nvPr>
             <p:extLst>
               <p:ext uri="{D42A27DB-BD31-4B8C-83A1-F6EECF244321}">
-                <p14:modId xmlns:p14="http://schemas.microsoft.com/office/powerpoint/2010/main" val="892164760"/>
+                <p14:modId xmlns:p14="http://schemas.microsoft.com/office/powerpoint/2010/main" val="2431556783"/>
               </p:ext>
             </p:extLst>
           </p:nvPr>
@@ -8125,10 +8497,14 @@
                         <a:srgbClr val="FFFFFF"/>
                       </a:solidFill>
                     </a:lnT>
-                    <a:lnB w="38100" cmpd="sng">
-                      <a:solidFill>
-                        <a:srgbClr val="FFFFFF"/>
-                      </a:solidFill>
+                    <a:lnB w="38100" cap="flat" cmpd="sng" algn="ctr">
+                      <a:solidFill>
+                        <a:srgbClr val="FFFFFF"/>
+                      </a:solidFill>
+                      <a:prstDash val="solid"/>
+                      <a:round/>
+                      <a:headEnd type="none" w="med" len="med"/>
+                      <a:tailEnd type="none" w="med" len="med"/>
                     </a:lnB>
                     <a:lnTlToBr w="12700" cmpd="sng">
                       <a:noFill/>
@@ -9031,10 +9407,14 @@
                         <a:srgbClr val="FFFFFF"/>
                       </a:solidFill>
                     </a:lnL>
-                    <a:lnR w="12700" cmpd="sng">
-                      <a:solidFill>
-                        <a:srgbClr val="FFFFFF"/>
-                      </a:solidFill>
+                    <a:lnR w="12700" cap="flat" cmpd="sng" algn="ctr">
+                      <a:solidFill>
+                        <a:srgbClr val="FFFFFF"/>
+                      </a:solidFill>
+                      <a:prstDash val="solid"/>
+                      <a:round/>
+                      <a:headEnd type="none" w="med" len="med"/>
+                      <a:tailEnd type="none" w="med" len="med"/>
                     </a:lnR>
                     <a:lnT w="38100" cmpd="sng">
                       <a:solidFill>
@@ -9139,39 +9519,14 @@
                       </a:lvl9pPr>
                     </a:lstStyle>
                     <a:p>
-                      <a:pPr marL="0" marR="0" lvl="0" indent="0" algn="l" defTabSz="685855" rtl="0" eaLnBrk="1" fontAlgn="auto" latinLnBrk="0" hangingPunct="1">
-                        <a:lnSpc>
-                          <a:spcPct val="100000"/>
-                        </a:lnSpc>
-                        <a:spcBef>
-                          <a:spcPts val="0"/>
-                        </a:spcBef>
-                        <a:spcAft>
-                          <a:spcPts val="0"/>
-                        </a:spcAft>
-                        <a:buClrTx/>
-                        <a:buSzTx/>
-                        <a:buFontTx/>
-                        <a:buNone/>
-                        <a:tabLst/>
-                        <a:defRPr/>
-                      </a:pPr>
+                      <a:pPr algn="l"/>
                       <a:r>
-                        <a:rPr kumimoji="0" lang="en-GB" sz="3200" b="1" i="0" u="none" strike="noStrike" kern="1200" cap="none" spc="0" normalizeH="0" baseline="0" dirty="0">
-                          <a:ln>
-                            <a:noFill/>
-                          </a:ln>
-                          <a:solidFill>
-                            <a:srgbClr val="7E9CB0"/>
-                          </a:solidFill>
-                          <a:effectLst/>
-                          <a:uLnTx/>
-                          <a:uFillTx/>
-                          <a:latin typeface="+mn-lt"/>
-                          <a:ea typeface="+mn-ea"/>
-                          <a:cs typeface="+mn-cs"/>
+                        <a:rPr lang="en-GB" sz="3200" b="1" dirty="0">
+                          <a:solidFill>
+                            <a:srgbClr val="435C6D"/>
+                          </a:solidFill>
                         </a:rPr>
-                        <a:t>NA</a:t>
+                        <a:t>95</a:t>
                       </a:r>
                     </a:p>
                   </a:txBody>
@@ -9305,10 +9660,14 @@
                     </a:p>
                   </a:txBody>
                   <a:tcPr>
-                    <a:lnL w="12700" cmpd="sng">
-                      <a:solidFill>
-                        <a:srgbClr val="FFFFFF"/>
-                      </a:solidFill>
+                    <a:lnL w="12700" cap="flat" cmpd="sng" algn="ctr">
+                      <a:solidFill>
+                        <a:srgbClr val="FFFFFF"/>
+                      </a:solidFill>
+                      <a:prstDash val="solid"/>
+                      <a:round/>
+                      <a:headEnd type="none" w="med" len="med"/>
+                      <a:tailEnd type="none" w="med" len="med"/>
                     </a:lnL>
                     <a:lnR w="12700" cap="flat" cmpd="sng" algn="ctr">
                       <a:solidFill>
@@ -10233,10 +10592,14 @@
                         <a:srgbClr val="FFFFFF"/>
                       </a:solidFill>
                     </a:lnL>
-                    <a:lnR w="12700" cmpd="sng">
-                      <a:solidFill>
-                        <a:srgbClr val="FFFFFF"/>
-                      </a:solidFill>
+                    <a:lnR w="12700" cap="flat" cmpd="sng" algn="ctr">
+                      <a:solidFill>
+                        <a:srgbClr val="FFFFFF"/>
+                      </a:solidFill>
+                      <a:prstDash val="solid"/>
+                      <a:round/>
+                      <a:headEnd type="none" w="med" len="med"/>
+                      <a:tailEnd type="none" w="med" len="med"/>
                     </a:lnR>
                     <a:lnT w="12700" cmpd="sng">
                       <a:solidFill>
@@ -10341,39 +10704,14 @@
                       </a:lvl9pPr>
                     </a:lstStyle>
                     <a:p>
-                      <a:pPr marL="0" marR="0" lvl="0" indent="0" algn="l" defTabSz="685855" rtl="0" eaLnBrk="1" fontAlgn="auto" latinLnBrk="0" hangingPunct="1">
-                        <a:lnSpc>
-                          <a:spcPct val="100000"/>
-                        </a:lnSpc>
-                        <a:spcBef>
-                          <a:spcPts val="0"/>
-                        </a:spcBef>
-                        <a:spcAft>
-                          <a:spcPts val="0"/>
-                        </a:spcAft>
-                        <a:buClrTx/>
-                        <a:buSzTx/>
-                        <a:buFontTx/>
-                        <a:buNone/>
-                        <a:tabLst/>
-                        <a:defRPr/>
-                      </a:pPr>
+                      <a:pPr algn="l"/>
                       <a:r>
-                        <a:rPr kumimoji="0" lang="en-GB" sz="3200" b="1" i="0" u="none" strike="noStrike" kern="1200" cap="none" spc="0" normalizeH="0" baseline="0" dirty="0">
-                          <a:ln>
-                            <a:noFill/>
-                          </a:ln>
-                          <a:solidFill>
-                            <a:srgbClr val="7E9CB0"/>
-                          </a:solidFill>
-                          <a:effectLst/>
-                          <a:uLnTx/>
-                          <a:uFillTx/>
-                          <a:latin typeface="+mn-lt"/>
-                          <a:ea typeface="+mn-ea"/>
-                          <a:cs typeface="+mn-cs"/>
+                        <a:rPr lang="en-GB" sz="3200" b="1" dirty="0">
+                          <a:solidFill>
+                            <a:srgbClr val="435C6D"/>
+                          </a:solidFill>
                         </a:rPr>
-                        <a:t>NA</a:t>
+                        <a:t>181</a:t>
                       </a:r>
                     </a:p>
                   </a:txBody>
@@ -10507,10 +10845,14 @@
                     </a:p>
                   </a:txBody>
                   <a:tcPr>
-                    <a:lnL w="12700" cmpd="sng">
-                      <a:solidFill>
-                        <a:srgbClr val="FFFFFF"/>
-                      </a:solidFill>
+                    <a:lnL w="12700" cap="flat" cmpd="sng" algn="ctr">
+                      <a:solidFill>
+                        <a:srgbClr val="FFFFFF"/>
+                      </a:solidFill>
+                      <a:prstDash val="solid"/>
+                      <a:round/>
+                      <a:headEnd type="none" w="med" len="med"/>
+                      <a:tailEnd type="none" w="med" len="med"/>
                     </a:lnL>
                     <a:lnR w="12700" cap="flat" cmpd="sng" algn="ctr">
                       <a:solidFill>
@@ -11563,39 +11905,14 @@
                       </a:lvl9pPr>
                     </a:lstStyle>
                     <a:p>
-                      <a:pPr marL="0" marR="0" lvl="0" indent="0" algn="l" defTabSz="685855" rtl="0" eaLnBrk="1" fontAlgn="auto" latinLnBrk="0" hangingPunct="1">
-                        <a:lnSpc>
-                          <a:spcPct val="100000"/>
-                        </a:lnSpc>
-                        <a:spcBef>
-                          <a:spcPts val="0"/>
-                        </a:spcBef>
-                        <a:spcAft>
-                          <a:spcPts val="0"/>
-                        </a:spcAft>
-                        <a:buClrTx/>
-                        <a:buSzTx/>
-                        <a:buFontTx/>
-                        <a:buNone/>
-                        <a:tabLst/>
-                        <a:defRPr/>
-                      </a:pPr>
+                      <a:pPr algn="l"/>
                       <a:r>
-                        <a:rPr kumimoji="0" lang="en-GB" sz="3200" b="1" i="0" u="none" strike="noStrike" kern="1200" cap="none" spc="0" normalizeH="0" baseline="0" dirty="0">
-                          <a:ln>
-                            <a:noFill/>
-                          </a:ln>
-                          <a:solidFill>
-                            <a:srgbClr val="7E9CB0"/>
-                          </a:solidFill>
-                          <a:effectLst/>
-                          <a:uLnTx/>
-                          <a:uFillTx/>
-                          <a:latin typeface="+mn-lt"/>
-                          <a:ea typeface="+mn-ea"/>
-                          <a:cs typeface="+mn-cs"/>
+                        <a:rPr lang="en-GB" sz="3200" b="1" dirty="0">
+                          <a:solidFill>
+                            <a:srgbClr val="435C6D"/>
+                          </a:solidFill>
                         </a:rPr>
-                        <a:t>NA</a:t>
+                        <a:t>88</a:t>
                       </a:r>
                     </a:p>
                   </a:txBody>
@@ -12789,39 +13106,14 @@
                       </a:lvl9pPr>
                     </a:lstStyle>
                     <a:p>
-                      <a:pPr marL="0" marR="0" lvl="0" indent="0" algn="l" defTabSz="685855" rtl="0" eaLnBrk="1" fontAlgn="auto" latinLnBrk="0" hangingPunct="1">
-                        <a:lnSpc>
-                          <a:spcPct val="100000"/>
-                        </a:lnSpc>
-                        <a:spcBef>
-                          <a:spcPts val="0"/>
-                        </a:spcBef>
-                        <a:spcAft>
-                          <a:spcPts val="0"/>
-                        </a:spcAft>
-                        <a:buClrTx/>
-                        <a:buSzTx/>
-                        <a:buFontTx/>
-                        <a:buNone/>
-                        <a:tabLst/>
-                        <a:defRPr/>
-                      </a:pPr>
+                      <a:pPr algn="l"/>
                       <a:r>
-                        <a:rPr kumimoji="0" lang="en-GB" sz="3200" b="1" i="0" u="none" strike="noStrike" kern="1200" cap="none" spc="0" normalizeH="0" baseline="0" dirty="0">
-                          <a:ln>
-                            <a:noFill/>
-                          </a:ln>
-                          <a:solidFill>
-                            <a:srgbClr val="7E9CB0"/>
-                          </a:solidFill>
-                          <a:effectLst/>
-                          <a:uLnTx/>
-                          <a:uFillTx/>
-                          <a:latin typeface="+mn-lt"/>
-                          <a:ea typeface="+mn-ea"/>
-                          <a:cs typeface="+mn-cs"/>
+                        <a:rPr lang="en-GB" sz="3200" b="1" dirty="0">
+                          <a:solidFill>
+                            <a:srgbClr val="435C6D"/>
+                          </a:solidFill>
                         </a:rPr>
-                        <a:t>NA</a:t>
+                        <a:t>101</a:t>
                       </a:r>
                     </a:p>
                   </a:txBody>
@@ -14007,40 +14299,12 @@
                       </a:lvl9pPr>
                     </a:lstStyle>
                     <a:p>
-                      <a:pPr marL="0" marR="0" lvl="0" indent="0" algn="l" defTabSz="685855" rtl="0" eaLnBrk="1" fontAlgn="auto" latinLnBrk="0" hangingPunct="1">
-                        <a:lnSpc>
-                          <a:spcPct val="100000"/>
-                        </a:lnSpc>
-                        <a:spcBef>
-                          <a:spcPts val="0"/>
-                        </a:spcBef>
-                        <a:spcAft>
-                          <a:spcPts val="0"/>
-                        </a:spcAft>
-                        <a:buClrTx/>
-                        <a:buSzTx/>
-                        <a:buFontTx/>
-                        <a:buNone/>
-                        <a:tabLst/>
-                        <a:defRPr/>
-                      </a:pPr>
-                      <a:r>
-                        <a:rPr kumimoji="0" lang="en-GB" sz="3200" b="1" i="0" u="none" strike="noStrike" kern="1200" cap="none" spc="0" normalizeH="0" baseline="0" dirty="0">
-                          <a:ln>
-                            <a:noFill/>
-                          </a:ln>
-                          <a:solidFill>
-                            <a:srgbClr val="7E9CB0"/>
-                          </a:solidFill>
-                          <a:effectLst/>
-                          <a:uLnTx/>
-                          <a:uFillTx/>
-                          <a:latin typeface="+mn-lt"/>
-                          <a:ea typeface="+mn-ea"/>
-                          <a:cs typeface="+mn-cs"/>
-                        </a:rPr>
-                        <a:t>NA</a:t>
-                      </a:r>
+                      <a:pPr algn="l"/>
+                      <a:endParaRPr lang="en-GB" sz="3200" b="1" dirty="0">
+                        <a:solidFill>
+                          <a:srgbClr val="435C6D"/>
+                        </a:solidFill>
+                      </a:endParaRPr>
                     </a:p>
                   </a:txBody>
                   <a:tcPr>
@@ -15251,39 +15515,14 @@
                       </a:lvl9pPr>
                     </a:lstStyle>
                     <a:p>
-                      <a:pPr marL="0" marR="0" lvl="0" indent="0" algn="l" defTabSz="685855" rtl="0" eaLnBrk="1" fontAlgn="auto" latinLnBrk="0" hangingPunct="1">
-                        <a:lnSpc>
-                          <a:spcPct val="100000"/>
-                        </a:lnSpc>
-                        <a:spcBef>
-                          <a:spcPts val="0"/>
-                        </a:spcBef>
-                        <a:spcAft>
-                          <a:spcPts val="0"/>
-                        </a:spcAft>
-                        <a:buClrTx/>
-                        <a:buSzTx/>
-                        <a:buFontTx/>
-                        <a:buNone/>
-                        <a:tabLst/>
-                        <a:defRPr/>
-                      </a:pPr>
+                      <a:pPr algn="l"/>
                       <a:r>
-                        <a:rPr kumimoji="0" lang="en-GB" sz="3200" b="1" i="0" u="none" strike="noStrike" kern="1200" cap="none" spc="0" normalizeH="0" baseline="0" dirty="0">
-                          <a:ln>
-                            <a:noFill/>
-                          </a:ln>
-                          <a:solidFill>
-                            <a:srgbClr val="7E9CB0"/>
-                          </a:solidFill>
-                          <a:effectLst/>
-                          <a:uLnTx/>
-                          <a:uFillTx/>
-                          <a:latin typeface="+mn-lt"/>
-                          <a:ea typeface="+mn-ea"/>
-                          <a:cs typeface="+mn-cs"/>
+                        <a:rPr lang="en-GB" sz="3200" b="1" dirty="0">
+                          <a:solidFill>
+                            <a:srgbClr val="435C6D"/>
+                          </a:solidFill>
                         </a:rPr>
-                        <a:t>NA</a:t>
+                        <a:t>99</a:t>
                       </a:r>
                     </a:p>
                   </a:txBody>
@@ -23806,7 +24045,7 @@
           <a:p>
             <a:r>
               <a:rPr lang="en-GB" dirty="0"/>
-              <a:t>Investigators transform the SDTM data into an analysis dataset, however, generated datasets are </a:t>
+              <a:t>Investigators manipulate the SDTM data into an analysis dataset, however, generated datasets are </a:t>
             </a:r>
             <a:r>
               <a:rPr lang="en-GB" b="1" dirty="0"/>
@@ -23862,9 +24101,12 @@
             </a:r>
             <a:r>
               <a:rPr lang="en-GB" b="1" dirty="0"/>
-              <a:t>occasionally misunderstood.</a:t>
+              <a:t>occasionally misunderstood</a:t>
             </a:r>
-            <a:endParaRPr lang="en-GB" dirty="0"/>
+            <a:r>
+              <a:rPr lang="en-GB" dirty="0"/>
+              <a:t>.</a:t>
+            </a:r>
           </a:p>
         </p:txBody>
       </p:sp>
@@ -24266,11 +24508,11 @@
             </a:r>
             <a:r>
               <a:rPr lang="en-GB" b="1" dirty="0"/>
-              <a:t>to ensure minimal confusion</a:t>
+              <a:t>to ensure minimal confusion;</a:t>
             </a:r>
             <a:r>
               <a:rPr lang="en-GB" dirty="0"/>
-              <a:t>, not assuming standardised units. </a:t>
+              <a:t> not assuming standardised units. </a:t>
             </a:r>
           </a:p>
           <a:p>
@@ -24529,7 +24771,31 @@
           <a:p>
             <a:r>
               <a:rPr lang="en-GB" dirty="0"/>
-              <a:t>Below is the transformed, truncated, dataset; providing a condensed, clear and easy to analyse data frame. </a:t>
+              <a:t>Below is the transformed, truncated, dataset; providing a </a:t>
+            </a:r>
+            <a:r>
+              <a:rPr lang="en-GB" b="1" dirty="0"/>
+              <a:t>condensed</a:t>
+            </a:r>
+            <a:r>
+              <a:rPr lang="en-GB" dirty="0"/>
+              <a:t>, </a:t>
+            </a:r>
+            <a:r>
+              <a:rPr lang="en-GB" b="1" dirty="0"/>
+              <a:t>clear</a:t>
+            </a:r>
+            <a:r>
+              <a:rPr lang="en-GB" dirty="0"/>
+              <a:t> and </a:t>
+            </a:r>
+            <a:r>
+              <a:rPr lang="en-GB" b="1" dirty="0"/>
+              <a:t>easy to analyse </a:t>
+            </a:r>
+            <a:r>
+              <a:rPr lang="en-GB" dirty="0"/>
+              <a:t>data frame. </a:t>
             </a:r>
           </a:p>
           <a:p>
@@ -25421,12 +25687,32 @@
 </file>
 
 <file path=customXml/item1.xml><?xml version="1.0" encoding="utf-8"?>
-<?mso-contentType ?>
-<FormTemplates xmlns="http://schemas.microsoft.com/sharepoint/v3/contenttype/forms">
-  <Display>DocumentLibraryForm</Display>
-  <Edit>DocumentLibraryForm</Edit>
-  <New>DocumentLibraryForm</New>
-</FormTemplates>
+<p:properties xmlns:p="http://schemas.microsoft.com/office/2006/metadata/properties" xmlns:xsi="http://www.w3.org/2001/XMLSchema-instance" xmlns:pc="http://schemas.microsoft.com/office/infopath/2007/PartnerControls">
+  <documentManagement>
+    <MediaLengthInSeconds xmlns="6cd05e2c-1080-4123-b907-f31487dbd913" xsi:nil="true"/>
+    <lcf76f155ced4ddcb4097134ff3c332f xmlns="6cd05e2c-1080-4123-b907-f31487dbd913">
+      <Terms xmlns="http://schemas.microsoft.com/office/infopath/2007/PartnerControls"/>
+    </lcf76f155ced4ddcb4097134ff3c332f>
+    <TaxCatchAll xmlns="42fd8685-662d-4ea0-adda-db2055aa5e88" xsi:nil="true"/>
+    <SharedWithUsers xmlns="42fd8685-662d-4ea0-adda-db2055aa5e88">
+      <UserInfo>
+        <DisplayName>Sheila Leaman</DisplayName>
+        <AccountId>51</AccountId>
+        <AccountType/>
+      </UserInfo>
+      <UserInfo>
+        <DisplayName>CDISC Communications</DisplayName>
+        <AccountId>155</AccountId>
+        <AccountType/>
+      </UserInfo>
+      <UserInfo>
+        <DisplayName>All CDISC</DisplayName>
+        <AccountId>164</AccountId>
+        <AccountType/>
+      </UserInfo>
+    </SharedWithUsers>
+  </documentManagement>
+</p:properties>
 </file>
 
 <file path=customXml/item2.xml><?xml version="1.0" encoding="utf-8"?>
@@ -25685,38 +25971,27 @@
 </file>
 
 <file path=customXml/item3.xml><?xml version="1.0" encoding="utf-8"?>
-<p:properties xmlns:p="http://schemas.microsoft.com/office/2006/metadata/properties" xmlns:xsi="http://www.w3.org/2001/XMLSchema-instance" xmlns:pc="http://schemas.microsoft.com/office/infopath/2007/PartnerControls">
-  <documentManagement>
-    <MediaLengthInSeconds xmlns="6cd05e2c-1080-4123-b907-f31487dbd913" xsi:nil="true"/>
-    <lcf76f155ced4ddcb4097134ff3c332f xmlns="6cd05e2c-1080-4123-b907-f31487dbd913">
-      <Terms xmlns="http://schemas.microsoft.com/office/infopath/2007/PartnerControls"/>
-    </lcf76f155ced4ddcb4097134ff3c332f>
-    <TaxCatchAll xmlns="42fd8685-662d-4ea0-adda-db2055aa5e88" xsi:nil="true"/>
-    <SharedWithUsers xmlns="42fd8685-662d-4ea0-adda-db2055aa5e88">
-      <UserInfo>
-        <DisplayName>Sheila Leaman</DisplayName>
-        <AccountId>51</AccountId>
-        <AccountType/>
-      </UserInfo>
-      <UserInfo>
-        <DisplayName>CDISC Communications</DisplayName>
-        <AccountId>155</AccountId>
-        <AccountType/>
-      </UserInfo>
-      <UserInfo>
-        <DisplayName>All CDISC</DisplayName>
-        <AccountId>164</AccountId>
-        <AccountType/>
-      </UserInfo>
-    </SharedWithUsers>
-  </documentManagement>
-</p:properties>
+<?mso-contentType ?>
+<FormTemplates xmlns="http://schemas.microsoft.com/sharepoint/v3/contenttype/forms">
+  <Display>DocumentLibraryForm</Display>
+  <Edit>DocumentLibraryForm</Edit>
+  <New>DocumentLibraryForm</New>
+</FormTemplates>
 </file>
 
 <file path=customXml/itemProps1.xml><?xml version="1.0" encoding="utf-8"?>
-<ds:datastoreItem xmlns:ds="http://schemas.openxmlformats.org/officeDocument/2006/customXml" ds:itemID="{3B69330B-154C-43B9-AAF7-1A571867C6C9}">
+<ds:datastoreItem xmlns:ds="http://schemas.openxmlformats.org/officeDocument/2006/customXml" ds:itemID="{EB3EAD0D-AD33-4DE9-A04C-ADBA8D81216E}">
   <ds:schemaRefs>
-    <ds:schemaRef ds:uri="http://schemas.microsoft.com/sharepoint/v3/contenttype/forms"/>
+    <ds:schemaRef ds:uri="6cd05e2c-1080-4123-b907-f31487dbd913"/>
+    <ds:schemaRef ds:uri="http://schemas.openxmlformats.org/package/2006/metadata/core-properties"/>
+    <ds:schemaRef ds:uri="http://schemas.microsoft.com/office/2006/documentManagement/types"/>
+    <ds:schemaRef ds:uri="http://schemas.microsoft.com/office/infopath/2007/PartnerControls"/>
+    <ds:schemaRef ds:uri="http://purl.org/dc/dcmitype/"/>
+    <ds:schemaRef ds:uri="http://schemas.microsoft.com/office/2006/metadata/properties"/>
+    <ds:schemaRef ds:uri="42fd8685-662d-4ea0-adda-db2055aa5e88"/>
+    <ds:schemaRef ds:uri="http://www.w3.org/XML/1998/namespace"/>
+    <ds:schemaRef ds:uri="http://purl.org/dc/terms/"/>
+    <ds:schemaRef ds:uri="http://purl.org/dc/elements/1.1/"/>
   </ds:schemaRefs>
 </ds:datastoreItem>
 </file>
@@ -25741,18 +26016,9 @@
 </file>
 
 <file path=customXml/itemProps3.xml><?xml version="1.0" encoding="utf-8"?>
-<ds:datastoreItem xmlns:ds="http://schemas.openxmlformats.org/officeDocument/2006/customXml" ds:itemID="{EB3EAD0D-AD33-4DE9-A04C-ADBA8D81216E}">
+<ds:datastoreItem xmlns:ds="http://schemas.openxmlformats.org/officeDocument/2006/customXml" ds:itemID="{3B69330B-154C-43B9-AAF7-1A571867C6C9}">
   <ds:schemaRefs>
-    <ds:schemaRef ds:uri="6cd05e2c-1080-4123-b907-f31487dbd913"/>
-    <ds:schemaRef ds:uri="http://schemas.openxmlformats.org/package/2006/metadata/core-properties"/>
-    <ds:schemaRef ds:uri="http://schemas.microsoft.com/office/2006/documentManagement/types"/>
-    <ds:schemaRef ds:uri="http://schemas.microsoft.com/office/infopath/2007/PartnerControls"/>
-    <ds:schemaRef ds:uri="http://purl.org/dc/dcmitype/"/>
-    <ds:schemaRef ds:uri="http://schemas.microsoft.com/office/2006/metadata/properties"/>
-    <ds:schemaRef ds:uri="42fd8685-662d-4ea0-adda-db2055aa5e88"/>
-    <ds:schemaRef ds:uri="http://www.w3.org/XML/1998/namespace"/>
-    <ds:schemaRef ds:uri="http://purl.org/dc/terms/"/>
-    <ds:schemaRef ds:uri="http://purl.org/dc/elements/1.1/"/>
+    <ds:schemaRef ds:uri="http://schemas.microsoft.com/sharepoint/v3/contenttype/forms"/>
   </ds:schemaRefs>
 </ds:datastoreItem>
 </file>
</xml_diff>

<commit_message>
Changes to some sentences
</commit_message>
<xml_diff>
--- a/inst/CDISC_Europe_Interchange_2024/CDISC_EI_2024-Poster.pptx
+++ b/inst/CDISC_Europe_Interchange_2024/CDISC_EI_2024-Poster.pptx
@@ -3902,23 +3902,15 @@
                     <a:srgbClr val="435C6D"/>
                   </a:solidFill>
                 </a:rPr>
-                <a:t>By not conforming to CDISC Analysis Data Model (</a:t>
+                <a:t>By renaming column names to longer, descriptive title, </a:t>
               </a:r>
               <a:r>
-                <a:rPr lang="en-GB" sz="3400" dirty="0" err="1">
+                <a:rPr lang="en-GB" sz="3400">
                   <a:solidFill>
                     <a:srgbClr val="435C6D"/>
                   </a:solidFill>
                 </a:rPr>
-                <a:t>ADaM</a:t>
-              </a:r>
-              <a:r>
-                <a:rPr lang="en-GB" sz="3400" dirty="0">
-                  <a:solidFill>
-                    <a:srgbClr val="435C6D"/>
-                  </a:solidFill>
-                </a:rPr>
-                <a:t>) terminology, the columns are </a:t>
+                <a:t>the features are </a:t>
               </a:r>
               <a:r>
                 <a:rPr lang="en-GB" sz="3400" b="1" dirty="0">
@@ -5047,7 +5039,7 @@
                   <a:ea typeface="+mn-ea"/>
                   <a:cs typeface="Arial" panose="020B0604020202020204" pitchFamily="34" charset="0"/>
                 </a:rPr>
-                <a:t>provides a coherent framework for the storage and pooling of studies and clinical trials.</a:t>
+                <a:t>provides a coherent framework for the storage, standardisation and pooling of studies and clinical trials data.</a:t>
               </a:r>
             </a:p>
             <a:p>
@@ -5225,7 +5217,7 @@
                   <a:ea typeface="+mn-ea"/>
                   <a:cs typeface="Arial" panose="020B0604020202020204" pitchFamily="34" charset="0"/>
                 </a:rPr>
-                <a:t>due to education, time and resource limitations.</a:t>
+                <a:t>due to training, time and resource limitations.</a:t>
               </a:r>
             </a:p>
             <a:p>
@@ -5669,9 +5661,9 @@
         <p:grpSpPr>
           <a:xfrm>
             <a:off x="21850350" y="5797079"/>
-            <a:ext cx="10451668" cy="8515715"/>
+            <a:ext cx="10451668" cy="8986613"/>
             <a:chOff x="699991" y="8353657"/>
-            <a:chExt cx="9456924" cy="8515715"/>
+            <a:chExt cx="9456924" cy="8986613"/>
           </a:xfrm>
         </p:grpSpPr>
         <p:sp>
@@ -5691,7 +5683,7 @@
           <p:spPr>
             <a:xfrm>
               <a:off x="699991" y="9200198"/>
-              <a:ext cx="9456924" cy="7669174"/>
+              <a:ext cx="9456924" cy="8140072"/>
             </a:xfrm>
             <a:prstGeom prst="rect">
               <a:avLst/>
@@ -6053,8 +6045,30 @@
                   <a:ea typeface="+mn-ea"/>
                   <a:cs typeface="Arial" panose="020B0604020202020204" pitchFamily="34" charset="0"/>
                 </a:rPr>
-                <a:t>so the terms or tests are now columns.</a:t>
+                <a:t>transforming the long data to a </a:t>
               </a:r>
+              <a:r>
+                <a:rPr lang="en-GB" sz="3400" dirty="0">
+                  <a:solidFill>
+                    <a:srgbClr val="435C6D"/>
+                  </a:solidFill>
+                </a:rPr>
+                <a:t>wide data format, with tests or terms as columns.</a:t>
+              </a:r>
+              <a:endParaRPr kumimoji="0" lang="en-GB" sz="3400" b="0" i="0" u="none" strike="noStrike" kern="1200" cap="none" spc="0" normalizeH="0" baseline="0" noProof="0" dirty="0">
+                <a:ln>
+                  <a:noFill/>
+                </a:ln>
+                <a:solidFill>
+                  <a:srgbClr val="435C6D"/>
+                </a:solidFill>
+                <a:effectLst/>
+                <a:uLnTx/>
+                <a:uFillTx/>
+                <a:latin typeface="Arial" panose="020B0604020202020204" pitchFamily="34" charset="0"/>
+                <a:ea typeface="+mn-ea"/>
+                <a:cs typeface="Arial" panose="020B0604020202020204" pitchFamily="34" charset="0"/>
+              </a:endParaRPr>
             </a:p>
             <a:p>
               <a:pPr>
@@ -6668,7 +6682,7 @@
                   <a:ea typeface="+mn-ea"/>
                   <a:cs typeface="Arial" panose="020B0604020202020204" pitchFamily="34" charset="0"/>
                 </a:rPr>
-                <a:t>open-source package </a:t>
+                <a:t>open-source R package </a:t>
               </a:r>
               <a:r>
                 <a:rPr kumimoji="0" lang="en-GB" sz="3400" b="0" i="0" u="none" strike="noStrike" kern="1200" cap="none" spc="0" normalizeH="0" baseline="0" noProof="0" dirty="0">
@@ -6702,7 +6716,7 @@
                   <a:ea typeface="+mn-ea"/>
                   <a:cs typeface="Arial" panose="020B0604020202020204" pitchFamily="34" charset="0"/>
                 </a:rPr>
-                <a:t>to analysis datasets</a:t>
+                <a:t>into analysis datasets</a:t>
               </a:r>
               <a:r>
                 <a:rPr kumimoji="0" lang="en-GB" sz="3400" b="0" i="0" u="none" strike="noStrike" kern="1200" cap="none" spc="0" normalizeH="0" baseline="0" noProof="0" dirty="0">
@@ -7827,7 +7841,7 @@
           <p:nvPr>
             <p:extLst>
               <p:ext uri="{D42A27DB-BD31-4B8C-83A1-F6EECF244321}">
-                <p14:modId xmlns:p14="http://schemas.microsoft.com/office/powerpoint/2010/main" val="2431556783"/>
+                <p14:modId xmlns:p14="http://schemas.microsoft.com/office/powerpoint/2010/main" val="3589955034"/>
               </p:ext>
             </p:extLst>
           </p:nvPr>
@@ -12851,7 +12865,7 @@
                             <a:srgbClr val="435C6D"/>
                           </a:solidFill>
                         </a:rPr>
-                        <a:t>101</a:t>
+                        <a:t>10100</a:t>
                       </a:r>
                     </a:p>
                   </a:txBody>
@@ -12984,7 +12998,7 @@
                             <a:srgbClr val="435C6D"/>
                           </a:solidFill>
                         </a:rPr>
-                        <a:t>g/L</a:t>
+                        <a:t>mg/dL</a:t>
                       </a:r>
                     </a:p>
                   </a:txBody>
@@ -25687,32 +25701,12 @@
 </file>
 
 <file path=customXml/item1.xml><?xml version="1.0" encoding="utf-8"?>
-<p:properties xmlns:p="http://schemas.microsoft.com/office/2006/metadata/properties" xmlns:xsi="http://www.w3.org/2001/XMLSchema-instance" xmlns:pc="http://schemas.microsoft.com/office/infopath/2007/PartnerControls">
-  <documentManagement>
-    <MediaLengthInSeconds xmlns="6cd05e2c-1080-4123-b907-f31487dbd913" xsi:nil="true"/>
-    <lcf76f155ced4ddcb4097134ff3c332f xmlns="6cd05e2c-1080-4123-b907-f31487dbd913">
-      <Terms xmlns="http://schemas.microsoft.com/office/infopath/2007/PartnerControls"/>
-    </lcf76f155ced4ddcb4097134ff3c332f>
-    <TaxCatchAll xmlns="42fd8685-662d-4ea0-adda-db2055aa5e88" xsi:nil="true"/>
-    <SharedWithUsers xmlns="42fd8685-662d-4ea0-adda-db2055aa5e88">
-      <UserInfo>
-        <DisplayName>Sheila Leaman</DisplayName>
-        <AccountId>51</AccountId>
-        <AccountType/>
-      </UserInfo>
-      <UserInfo>
-        <DisplayName>CDISC Communications</DisplayName>
-        <AccountId>155</AccountId>
-        <AccountType/>
-      </UserInfo>
-      <UserInfo>
-        <DisplayName>All CDISC</DisplayName>
-        <AccountId>164</AccountId>
-        <AccountType/>
-      </UserInfo>
-    </SharedWithUsers>
-  </documentManagement>
-</p:properties>
+<?mso-contentType ?>
+<FormTemplates xmlns="http://schemas.microsoft.com/sharepoint/v3/contenttype/forms">
+  <Display>DocumentLibraryForm</Display>
+  <Edit>DocumentLibraryForm</Edit>
+  <New>DocumentLibraryForm</New>
+</FormTemplates>
 </file>
 
 <file path=customXml/item2.xml><?xml version="1.0" encoding="utf-8"?>
@@ -25971,27 +25965,38 @@
 </file>
 
 <file path=customXml/item3.xml><?xml version="1.0" encoding="utf-8"?>
-<?mso-contentType ?>
-<FormTemplates xmlns="http://schemas.microsoft.com/sharepoint/v3/contenttype/forms">
-  <Display>DocumentLibraryForm</Display>
-  <Edit>DocumentLibraryForm</Edit>
-  <New>DocumentLibraryForm</New>
-</FormTemplates>
+<p:properties xmlns:p="http://schemas.microsoft.com/office/2006/metadata/properties" xmlns:xsi="http://www.w3.org/2001/XMLSchema-instance" xmlns:pc="http://schemas.microsoft.com/office/infopath/2007/PartnerControls">
+  <documentManagement>
+    <MediaLengthInSeconds xmlns="6cd05e2c-1080-4123-b907-f31487dbd913" xsi:nil="true"/>
+    <lcf76f155ced4ddcb4097134ff3c332f xmlns="6cd05e2c-1080-4123-b907-f31487dbd913">
+      <Terms xmlns="http://schemas.microsoft.com/office/infopath/2007/PartnerControls"/>
+    </lcf76f155ced4ddcb4097134ff3c332f>
+    <TaxCatchAll xmlns="42fd8685-662d-4ea0-adda-db2055aa5e88" xsi:nil="true"/>
+    <SharedWithUsers xmlns="42fd8685-662d-4ea0-adda-db2055aa5e88">
+      <UserInfo>
+        <DisplayName>Sheila Leaman</DisplayName>
+        <AccountId>51</AccountId>
+        <AccountType/>
+      </UserInfo>
+      <UserInfo>
+        <DisplayName>CDISC Communications</DisplayName>
+        <AccountId>155</AccountId>
+        <AccountType/>
+      </UserInfo>
+      <UserInfo>
+        <DisplayName>All CDISC</DisplayName>
+        <AccountId>164</AccountId>
+        <AccountType/>
+      </UserInfo>
+    </SharedWithUsers>
+  </documentManagement>
+</p:properties>
 </file>
 
 <file path=customXml/itemProps1.xml><?xml version="1.0" encoding="utf-8"?>
-<ds:datastoreItem xmlns:ds="http://schemas.openxmlformats.org/officeDocument/2006/customXml" ds:itemID="{EB3EAD0D-AD33-4DE9-A04C-ADBA8D81216E}">
+<ds:datastoreItem xmlns:ds="http://schemas.openxmlformats.org/officeDocument/2006/customXml" ds:itemID="{3B69330B-154C-43B9-AAF7-1A571867C6C9}">
   <ds:schemaRefs>
-    <ds:schemaRef ds:uri="6cd05e2c-1080-4123-b907-f31487dbd913"/>
-    <ds:schemaRef ds:uri="http://schemas.openxmlformats.org/package/2006/metadata/core-properties"/>
-    <ds:schemaRef ds:uri="http://schemas.microsoft.com/office/2006/documentManagement/types"/>
-    <ds:schemaRef ds:uri="http://schemas.microsoft.com/office/infopath/2007/PartnerControls"/>
-    <ds:schemaRef ds:uri="http://purl.org/dc/dcmitype/"/>
-    <ds:schemaRef ds:uri="http://schemas.microsoft.com/office/2006/metadata/properties"/>
-    <ds:schemaRef ds:uri="42fd8685-662d-4ea0-adda-db2055aa5e88"/>
-    <ds:schemaRef ds:uri="http://www.w3.org/XML/1998/namespace"/>
-    <ds:schemaRef ds:uri="http://purl.org/dc/terms/"/>
-    <ds:schemaRef ds:uri="http://purl.org/dc/elements/1.1/"/>
+    <ds:schemaRef ds:uri="http://schemas.microsoft.com/sharepoint/v3/contenttype/forms"/>
   </ds:schemaRefs>
 </ds:datastoreItem>
 </file>
@@ -26016,9 +26021,18 @@
 </file>
 
 <file path=customXml/itemProps3.xml><?xml version="1.0" encoding="utf-8"?>
-<ds:datastoreItem xmlns:ds="http://schemas.openxmlformats.org/officeDocument/2006/customXml" ds:itemID="{3B69330B-154C-43B9-AAF7-1A571867C6C9}">
+<ds:datastoreItem xmlns:ds="http://schemas.openxmlformats.org/officeDocument/2006/customXml" ds:itemID="{EB3EAD0D-AD33-4DE9-A04C-ADBA8D81216E}">
   <ds:schemaRefs>
-    <ds:schemaRef ds:uri="http://schemas.microsoft.com/sharepoint/v3/contenttype/forms"/>
+    <ds:schemaRef ds:uri="6cd05e2c-1080-4123-b907-f31487dbd913"/>
+    <ds:schemaRef ds:uri="http://schemas.openxmlformats.org/package/2006/metadata/core-properties"/>
+    <ds:schemaRef ds:uri="http://schemas.microsoft.com/office/2006/documentManagement/types"/>
+    <ds:schemaRef ds:uri="http://schemas.microsoft.com/office/infopath/2007/PartnerControls"/>
+    <ds:schemaRef ds:uri="http://purl.org/dc/dcmitype/"/>
+    <ds:schemaRef ds:uri="http://schemas.microsoft.com/office/2006/metadata/properties"/>
+    <ds:schemaRef ds:uri="42fd8685-662d-4ea0-adda-db2055aa5e88"/>
+    <ds:schemaRef ds:uri="http://www.w3.org/XML/1998/namespace"/>
+    <ds:schemaRef ds:uri="http://purl.org/dc/terms/"/>
+    <ds:schemaRef ds:uri="http://purl.org/dc/elements/1.1/"/>
   </ds:schemaRefs>
 </ds:datastoreItem>
 </file>
</xml_diff>